<commit_message>
some modifications and added dataset info
</commit_message>
<xml_diff>
--- a/Proposal.pptx
+++ b/Proposal.pptx
@@ -5,27 +5,28 @@
     <p:sldMasterId id="2147483648" r:id="rId1"/>
   </p:sldMasterIdLst>
   <p:notesMasterIdLst>
-    <p:notesMasterId r:id="rId20"/>
+    <p:notesMasterId r:id="rId21"/>
   </p:notesMasterIdLst>
   <p:sldIdLst>
     <p:sldId id="256" r:id="rId2"/>
-    <p:sldId id="271" r:id="rId3"/>
-    <p:sldId id="257" r:id="rId4"/>
-    <p:sldId id="258" r:id="rId5"/>
-    <p:sldId id="261" r:id="rId6"/>
-    <p:sldId id="263" r:id="rId7"/>
-    <p:sldId id="264" r:id="rId8"/>
-    <p:sldId id="265" r:id="rId9"/>
-    <p:sldId id="275" r:id="rId10"/>
-    <p:sldId id="276" r:id="rId11"/>
-    <p:sldId id="277" r:id="rId12"/>
-    <p:sldId id="266" r:id="rId13"/>
-    <p:sldId id="270" r:id="rId14"/>
-    <p:sldId id="267" r:id="rId15"/>
-    <p:sldId id="269" r:id="rId16"/>
+    <p:sldId id="257" r:id="rId3"/>
+    <p:sldId id="258" r:id="rId4"/>
+    <p:sldId id="261" r:id="rId5"/>
+    <p:sldId id="263" r:id="rId6"/>
+    <p:sldId id="264" r:id="rId7"/>
+    <p:sldId id="265" r:id="rId8"/>
+    <p:sldId id="275" r:id="rId9"/>
+    <p:sldId id="276" r:id="rId10"/>
+    <p:sldId id="277" r:id="rId11"/>
+    <p:sldId id="266" r:id="rId12"/>
+    <p:sldId id="270" r:id="rId13"/>
+    <p:sldId id="267" r:id="rId14"/>
+    <p:sldId id="269" r:id="rId15"/>
+    <p:sldId id="272" r:id="rId16"/>
     <p:sldId id="273" r:id="rId17"/>
-    <p:sldId id="272" r:id="rId18"/>
+    <p:sldId id="279" r:id="rId18"/>
     <p:sldId id="274" r:id="rId19"/>
+    <p:sldId id="278" r:id="rId20"/>
   </p:sldIdLst>
   <p:sldSz cx="12192000" cy="6858000"/>
   <p:notesSz cx="6858000" cy="9144000"/>
@@ -124,6 +125,11 @@
       </a:defRPr>
     </a:lvl9pPr>
   </p:defaultTextStyle>
+  <p:extLst>
+    <p:ext uri="{EFAFB233-063F-42B5-8137-9DF3F51BA10A}">
+      <p15:sldGuideLst xmlns:p15="http://schemas.microsoft.com/office/powerpoint/2012/main"/>
+    </p:ext>
+  </p:extLst>
 </p:presentation>
 </file>
 
@@ -521,7 +527,10 @@
           <a:bodyPr/>
           <a:lstStyle/>
           <a:p>
-            <a:endParaRPr lang="en-CA" dirty="0"/>
+            <a:r>
+              <a:rPr lang="en-US" dirty="0"/>
+              <a:t>Add dataset source</a:t>
+            </a:r>
           </a:p>
         </p:txBody>
       </p:sp>
@@ -542,7 +551,91 @@
           <a:p>
             <a:fld id="{F635A496-EDE2-4BAC-A9F4-438BB6A66E5A}" type="slidenum">
               <a:rPr lang="en-CA" smtClean="0"/>
-              <a:t>10</a:t>
+              <a:t>4</a:t>
+            </a:fld>
+            <a:endParaRPr lang="en-CA"/>
+          </a:p>
+        </p:txBody>
+      </p:sp>
+    </p:spTree>
+    <p:extLst>
+      <p:ext uri="{BB962C8B-B14F-4D97-AF65-F5344CB8AC3E}">
+        <p14:creationId xmlns:p14="http://schemas.microsoft.com/office/powerpoint/2010/main" val="1984174973"/>
+      </p:ext>
+    </p:extLst>
+  </p:cSld>
+  <p:clrMapOvr>
+    <a:masterClrMapping/>
+  </p:clrMapOvr>
+</p:notes>
+</file>
+
+<file path=ppt/notesSlides/notesSlide2.xml><?xml version="1.0" encoding="utf-8"?>
+<p:notes xmlns:a="http://schemas.openxmlformats.org/drawingml/2006/main" xmlns:r="http://schemas.openxmlformats.org/officeDocument/2006/relationships" xmlns:p="http://schemas.openxmlformats.org/presentationml/2006/main">
+  <p:cSld>
+    <p:spTree>
+      <p:nvGrpSpPr>
+        <p:cNvPr id="1" name=""/>
+        <p:cNvGrpSpPr/>
+        <p:nvPr/>
+      </p:nvGrpSpPr>
+      <p:grpSpPr>
+        <a:xfrm>
+          <a:off x="0" y="0"/>
+          <a:ext cx="0" cy="0"/>
+          <a:chOff x="0" y="0"/>
+          <a:chExt cx="0" cy="0"/>
+        </a:xfrm>
+      </p:grpSpPr>
+      <p:sp>
+        <p:nvSpPr>
+          <p:cNvPr id="2" name="Slide Image Placeholder 1"/>
+          <p:cNvSpPr>
+            <a:spLocks noGrp="1" noRot="1" noChangeAspect="1"/>
+          </p:cNvSpPr>
+          <p:nvPr>
+            <p:ph type="sldImg"/>
+          </p:nvPr>
+        </p:nvSpPr>
+        <p:spPr/>
+      </p:sp>
+      <p:sp>
+        <p:nvSpPr>
+          <p:cNvPr id="3" name="Notes Placeholder 2"/>
+          <p:cNvSpPr>
+            <a:spLocks noGrp="1"/>
+          </p:cNvSpPr>
+          <p:nvPr>
+            <p:ph type="body" idx="1"/>
+          </p:nvPr>
+        </p:nvSpPr>
+        <p:spPr/>
+        <p:txBody>
+          <a:bodyPr/>
+          <a:lstStyle/>
+          <a:p>
+            <a:endParaRPr lang="en-CA" dirty="0"/>
+          </a:p>
+        </p:txBody>
+      </p:sp>
+      <p:sp>
+        <p:nvSpPr>
+          <p:cNvPr id="4" name="Slide Number Placeholder 3"/>
+          <p:cNvSpPr>
+            <a:spLocks noGrp="1"/>
+          </p:cNvSpPr>
+          <p:nvPr>
+            <p:ph type="sldNum" sz="quarter" idx="5"/>
+          </p:nvPr>
+        </p:nvSpPr>
+        <p:spPr/>
+        <p:txBody>
+          <a:bodyPr/>
+          <a:lstStyle/>
+          <a:p>
+            <a:fld id="{F635A496-EDE2-4BAC-A9F4-438BB6A66E5A}" type="slidenum">
+              <a:rPr lang="en-CA" smtClean="0"/>
+              <a:t>9</a:t>
             </a:fld>
             <a:endParaRPr lang="en-CA"/>
           </a:p>
@@ -3814,12 +3907,14 @@
         </p:nvSpPr>
         <p:spPr>
           <a:xfrm>
-            <a:off x="1524000" y="2235200"/>
-            <a:ext cx="9144000" cy="2387600"/>
+            <a:off x="352426" y="2220912"/>
+            <a:ext cx="5576888" cy="1808163"/>
           </a:xfrm>
         </p:spPr>
         <p:txBody>
-          <a:bodyPr/>
+          <a:bodyPr>
+            <a:normAutofit fontScale="90000"/>
+          </a:bodyPr>
           <a:lstStyle/>
           <a:p>
             <a:r>
@@ -3829,6 +3924,36 @@
           </a:p>
         </p:txBody>
       </p:sp>
+      <p:pic>
+        <p:nvPicPr>
+          <p:cNvPr id="4" name="Picture 3">
+            <a:extLst>
+              <a:ext uri="{FF2B5EF4-FFF2-40B4-BE49-F238E27FC236}">
+                <a16:creationId xmlns:a16="http://schemas.microsoft.com/office/drawing/2014/main" id="{D0A799EA-2DD2-EE41-8FEE-DBEC4F3EED52}"/>
+              </a:ext>
+            </a:extLst>
+          </p:cNvPr>
+          <p:cNvPicPr>
+            <a:picLocks noChangeAspect="1"/>
+          </p:cNvPicPr>
+          <p:nvPr/>
+        </p:nvPicPr>
+        <p:blipFill>
+          <a:blip r:embed="rId2"/>
+          <a:stretch>
+            <a:fillRect/>
+          </a:stretch>
+        </p:blipFill>
+        <p:spPr>
+          <a:xfrm>
+            <a:off x="5929314" y="628658"/>
+            <a:ext cx="6069663" cy="4832349"/>
+          </a:xfrm>
+          <a:prstGeom prst="rect">
+            <a:avLst/>
+          </a:prstGeom>
+        </p:spPr>
+      </p:pic>
     </p:spTree>
     <p:extLst>
       <p:ext uri="{BB962C8B-B14F-4D97-AF65-F5344CB8AC3E}">
@@ -3839,6 +3964,81 @@
   <p:clrMapOvr>
     <a:masterClrMapping/>
   </p:clrMapOvr>
+  <p:timing>
+    <p:tnLst>
+      <p:par>
+        <p:cTn id="1" dur="indefinite" restart="never" nodeType="tmRoot">
+          <p:childTnLst>
+            <p:seq concurrent="1" nextAc="seek">
+              <p:cTn id="2" dur="indefinite" nodeType="mainSeq">
+                <p:childTnLst>
+                  <p:par>
+                    <p:cTn id="3" fill="hold">
+                      <p:stCondLst>
+                        <p:cond delay="indefinite"/>
+                      </p:stCondLst>
+                      <p:childTnLst>
+                        <p:par>
+                          <p:cTn id="4" fill="hold">
+                            <p:stCondLst>
+                              <p:cond delay="0"/>
+                            </p:stCondLst>
+                            <p:childTnLst>
+                              <p:par>
+                                <p:cTn id="5" presetID="1" presetClass="entr" presetSubtype="0" fill="hold" nodeType="clickEffect">
+                                  <p:stCondLst>
+                                    <p:cond delay="0"/>
+                                  </p:stCondLst>
+                                  <p:childTnLst>
+                                    <p:set>
+                                      <p:cBhvr>
+                                        <p:cTn id="6" dur="1" fill="hold">
+                                          <p:stCondLst>
+                                            <p:cond delay="0"/>
+                                          </p:stCondLst>
+                                        </p:cTn>
+                                        <p:tgtEl>
+                                          <p:spTgt spid="4"/>
+                                        </p:tgtEl>
+                                        <p:attrNameLst>
+                                          <p:attrName>style.visibility</p:attrName>
+                                        </p:attrNameLst>
+                                      </p:cBhvr>
+                                      <p:to>
+                                        <p:strVal val="visible"/>
+                                      </p:to>
+                                    </p:set>
+                                  </p:childTnLst>
+                                </p:cTn>
+                              </p:par>
+                            </p:childTnLst>
+                          </p:cTn>
+                        </p:par>
+                      </p:childTnLst>
+                    </p:cTn>
+                  </p:par>
+                </p:childTnLst>
+              </p:cTn>
+              <p:prevCondLst>
+                <p:cond evt="onPrev" delay="0">
+                  <p:tgtEl>
+                    <p:sldTgt/>
+                  </p:tgtEl>
+                </p:cond>
+              </p:prevCondLst>
+              <p:nextCondLst>
+                <p:cond evt="onNext" delay="0">
+                  <p:tgtEl>
+                    <p:sldTgt/>
+                  </p:tgtEl>
+                </p:cond>
+              </p:nextCondLst>
+            </p:seq>
+          </p:childTnLst>
+        </p:cTn>
+      </p:par>
+    </p:tnLst>
+  </p:timing>
 </p:sld>
 </file>
 
@@ -3861,94 +4061,157 @@
       </p:grpSpPr>
       <p:sp>
         <p:nvSpPr>
-          <p:cNvPr id="2" name="Title 1">
-            <a:extLst>
-              <a:ext uri="{FF2B5EF4-FFF2-40B4-BE49-F238E27FC236}">
-                <a16:creationId xmlns:a16="http://schemas.microsoft.com/office/drawing/2014/main" id="{E92FDF02-115D-46E1-A69D-9631888D4F04}"/>
-              </a:ext>
-            </a:extLst>
-          </p:cNvPr>
-          <p:cNvSpPr>
-            <a:spLocks noGrp="1"/>
-          </p:cNvSpPr>
-          <p:nvPr>
-            <p:ph type="title"/>
-          </p:nvPr>
-        </p:nvSpPr>
-        <p:spPr/>
-        <p:txBody>
-          <a:bodyPr/>
-          <a:lstStyle/>
-          <a:p>
-            <a:r>
-              <a:rPr lang="en-CA" dirty="0"/>
-              <a:t>Our Approach</a:t>
-            </a:r>
-          </a:p>
-        </p:txBody>
-      </p:sp>
-      <p:sp>
-        <p:nvSpPr>
-          <p:cNvPr id="3" name="Content Placeholder 2">
-            <a:extLst>
-              <a:ext uri="{FF2B5EF4-FFF2-40B4-BE49-F238E27FC236}">
-                <a16:creationId xmlns:a16="http://schemas.microsoft.com/office/drawing/2014/main" id="{F6C05C56-86B0-49AE-A0B7-BC021DA5BC0A}"/>
-              </a:ext>
-            </a:extLst>
-          </p:cNvPr>
-          <p:cNvSpPr>
-            <a:spLocks noGrp="1"/>
-          </p:cNvSpPr>
-          <p:nvPr>
-            <p:ph idx="1"/>
-          </p:nvPr>
-        </p:nvSpPr>
-        <p:spPr/>
-        <p:txBody>
-          <a:bodyPr/>
-          <a:lstStyle/>
-          <a:p>
-            <a:r>
-              <a:rPr lang="en-CA" dirty="0"/>
-              <a:t>Transfer learning on targeted domain: achieve better performance on target domain while benefiting from source domain (dialog space is both source and target domain)</a:t>
-            </a:r>
-          </a:p>
-          <a:p>
-            <a:endParaRPr lang="en-CA" dirty="0"/>
-          </a:p>
-          <a:p>
-            <a:r>
-              <a:rPr lang="en-CA" dirty="0"/>
+          <p:cNvPr id="3" name="TextBox 2">
+            <a:extLst>
+              <a:ext uri="{FF2B5EF4-FFF2-40B4-BE49-F238E27FC236}">
+                <a16:creationId xmlns:a16="http://schemas.microsoft.com/office/drawing/2014/main" id="{B875B024-DCD7-5D44-81E6-E45B9E1EA58A}"/>
+              </a:ext>
+            </a:extLst>
+          </p:cNvPr>
+          <p:cNvSpPr txBox="1"/>
+          <p:nvPr/>
+        </p:nvSpPr>
+        <p:spPr>
+          <a:xfrm>
+            <a:off x="1157288" y="314325"/>
+            <a:ext cx="9513887" cy="984885"/>
+          </a:xfrm>
+          <a:prstGeom prst="rect">
+            <a:avLst/>
+          </a:prstGeom>
+          <a:noFill/>
+        </p:spPr>
+        <p:txBody>
+          <a:bodyPr wrap="none" rtlCol="0">
+            <a:spAutoFit/>
+          </a:bodyPr>
+          <a:lstStyle/>
+          <a:p>
+            <a:r>
+              <a:rPr lang="en-CA" sz="4000" dirty="0"/>
               <a:t>Intent based dialog management using LSTM</a:t>
             </a:r>
           </a:p>
           <a:p>
-            <a:endParaRPr lang="en-CA" dirty="0"/>
-          </a:p>
-          <a:p>
-            <a:r>
-              <a:rPr lang="en-CA" dirty="0"/>
-              <a:t>Interlocutor tracking system</a:t>
-            </a:r>
-          </a:p>
-          <a:p>
-            <a:endParaRPr lang="en-CA" dirty="0"/>
-          </a:p>
-          <a:p>
-            <a:endParaRPr lang="en-CA" dirty="0"/>
-          </a:p>
-        </p:txBody>
-      </p:sp>
+            <a:endParaRPr lang="en-US" dirty="0"/>
+          </a:p>
+        </p:txBody>
+      </p:sp>
+      <p:pic>
+        <p:nvPicPr>
+          <p:cNvPr id="6" name="Picture 5">
+            <a:extLst>
+              <a:ext uri="{FF2B5EF4-FFF2-40B4-BE49-F238E27FC236}">
+                <a16:creationId xmlns:a16="http://schemas.microsoft.com/office/drawing/2014/main" id="{651A44AF-EC96-ED41-AC8C-AE2AF157A4A1}"/>
+              </a:ext>
+            </a:extLst>
+          </p:cNvPr>
+          <p:cNvPicPr>
+            <a:picLocks noChangeAspect="1"/>
+          </p:cNvPicPr>
+          <p:nvPr/>
+        </p:nvPicPr>
+        <p:blipFill>
+          <a:blip r:embed="rId2"/>
+          <a:stretch>
+            <a:fillRect/>
+          </a:stretch>
+        </p:blipFill>
+        <p:spPr>
+          <a:xfrm>
+            <a:off x="1464351" y="1300075"/>
+            <a:ext cx="8691750" cy="4257849"/>
+          </a:xfrm>
+          <a:prstGeom prst="rect">
+            <a:avLst/>
+          </a:prstGeom>
+        </p:spPr>
+      </p:pic>
     </p:spTree>
     <p:extLst>
       <p:ext uri="{BB962C8B-B14F-4D97-AF65-F5344CB8AC3E}">
-        <p14:creationId xmlns:p14="http://schemas.microsoft.com/office/powerpoint/2010/main" val="2354734232"/>
+        <p14:creationId xmlns:p14="http://schemas.microsoft.com/office/powerpoint/2010/main" val="507115473"/>
       </p:ext>
     </p:extLst>
   </p:cSld>
   <p:clrMapOvr>
     <a:masterClrMapping/>
   </p:clrMapOvr>
+  <p:timing>
+    <p:tnLst>
+      <p:par>
+        <p:cTn id="1" dur="indefinite" restart="never" nodeType="tmRoot">
+          <p:childTnLst>
+            <p:seq concurrent="1" nextAc="seek">
+              <p:cTn id="2" dur="indefinite" nodeType="mainSeq">
+                <p:childTnLst>
+                  <p:par>
+                    <p:cTn id="3" fill="hold">
+                      <p:stCondLst>
+                        <p:cond delay="indefinite"/>
+                      </p:stCondLst>
+                      <p:childTnLst>
+                        <p:par>
+                          <p:cTn id="4" fill="hold">
+                            <p:stCondLst>
+                              <p:cond delay="0"/>
+                            </p:stCondLst>
+                            <p:childTnLst>
+                              <p:par>
+                                <p:cTn id="5" presetID="1" presetClass="entr" presetSubtype="0" fill="hold" nodeType="clickEffect">
+                                  <p:stCondLst>
+                                    <p:cond delay="0"/>
+                                  </p:stCondLst>
+                                  <p:childTnLst>
+                                    <p:set>
+                                      <p:cBhvr>
+                                        <p:cTn id="6" dur="1" fill="hold">
+                                          <p:stCondLst>
+                                            <p:cond delay="0"/>
+                                          </p:stCondLst>
+                                        </p:cTn>
+                                        <p:tgtEl>
+                                          <p:spTgt spid="6"/>
+                                        </p:tgtEl>
+                                        <p:attrNameLst>
+                                          <p:attrName>style.visibility</p:attrName>
+                                        </p:attrNameLst>
+                                      </p:cBhvr>
+                                      <p:to>
+                                        <p:strVal val="visible"/>
+                                      </p:to>
+                                    </p:set>
+                                  </p:childTnLst>
+                                </p:cTn>
+                              </p:par>
+                            </p:childTnLst>
+                          </p:cTn>
+                        </p:par>
+                      </p:childTnLst>
+                    </p:cTn>
+                  </p:par>
+                </p:childTnLst>
+              </p:cTn>
+              <p:prevCondLst>
+                <p:cond evt="onPrev" delay="0">
+                  <p:tgtEl>
+                    <p:sldTgt/>
+                  </p:tgtEl>
+                </p:cond>
+              </p:prevCondLst>
+              <p:nextCondLst>
+                <p:cond evt="onNext" delay="0">
+                  <p:tgtEl>
+                    <p:sldTgt/>
+                  </p:tgtEl>
+                </p:cond>
+              </p:nextCondLst>
+            </p:seq>
+          </p:childTnLst>
+        </p:cTn>
+      </p:par>
+    </p:tnLst>
+  </p:timing>
 </p:sld>
 </file>
 
@@ -3969,66 +4232,6 @@
           <a:chExt cx="0" cy="0"/>
         </a:xfrm>
       </p:grpSpPr>
-      <p:pic>
-        <p:nvPicPr>
-          <p:cNvPr id="4" name="Picture 3">
-            <a:extLst>
-              <a:ext uri="{FF2B5EF4-FFF2-40B4-BE49-F238E27FC236}">
-                <a16:creationId xmlns:a16="http://schemas.microsoft.com/office/drawing/2014/main" id="{BC883D36-ABEA-4EA6-A37C-85D7B8AF987C}"/>
-              </a:ext>
-            </a:extLst>
-          </p:cNvPr>
-          <p:cNvPicPr>
-            <a:picLocks noChangeAspect="1"/>
-          </p:cNvPicPr>
-          <p:nvPr/>
-        </p:nvPicPr>
-        <p:blipFill>
-          <a:blip r:embed="rId2"/>
-          <a:stretch>
-            <a:fillRect/>
-          </a:stretch>
-        </p:blipFill>
-        <p:spPr>
-          <a:xfrm>
-            <a:off x="0" y="442737"/>
-            <a:ext cx="12192000" cy="5972525"/>
-          </a:xfrm>
-          <a:prstGeom prst="rect">
-            <a:avLst/>
-          </a:prstGeom>
-        </p:spPr>
-      </p:pic>
-    </p:spTree>
-    <p:extLst>
-      <p:ext uri="{BB962C8B-B14F-4D97-AF65-F5344CB8AC3E}">
-        <p14:creationId xmlns:p14="http://schemas.microsoft.com/office/powerpoint/2010/main" val="507115473"/>
-      </p:ext>
-    </p:extLst>
-  </p:cSld>
-  <p:clrMapOvr>
-    <a:masterClrMapping/>
-  </p:clrMapOvr>
-</p:sld>
-</file>
-
-<file path=ppt/slides/slide12.xml><?xml version="1.0" encoding="utf-8"?>
-<p:sld xmlns:a="http://schemas.openxmlformats.org/drawingml/2006/main" xmlns:r="http://schemas.openxmlformats.org/officeDocument/2006/relationships" xmlns:p="http://schemas.openxmlformats.org/presentationml/2006/main">
-  <p:cSld>
-    <p:spTree>
-      <p:nvGrpSpPr>
-        <p:cNvPr id="1" name=""/>
-        <p:cNvGrpSpPr/>
-        <p:nvPr/>
-      </p:nvGrpSpPr>
-      <p:grpSpPr>
-        <a:xfrm>
-          <a:off x="0" y="0"/>
-          <a:ext cx="0" cy="0"/>
-          <a:chOff x="0" y="0"/>
-          <a:chExt cx="0" cy="0"/>
-        </a:xfrm>
-      </p:grpSpPr>
       <p:sp>
         <p:nvSpPr>
           <p:cNvPr id="2" name="Title 1">
@@ -4059,7 +4262,7 @@
           <a:p>
             <a:r>
               <a:rPr lang="en-CA" dirty="0"/>
-              <a:t>B/W Image Color Restoration w/ Super Resolution</a:t>
+              <a:t>B/W Image Color Restoration with Super Resolution</a:t>
             </a:r>
           </a:p>
         </p:txBody>
@@ -4077,7 +4280,7 @@
 </p:sld>
 </file>
 
-<file path=ppt/slides/slide13.xml><?xml version="1.0" encoding="utf-8"?>
+<file path=ppt/slides/slide12.xml><?xml version="1.0" encoding="utf-8"?>
 <p:sld xmlns:a="http://schemas.openxmlformats.org/drawingml/2006/main" xmlns:r="http://schemas.openxmlformats.org/officeDocument/2006/relationships" xmlns:p="http://schemas.openxmlformats.org/presentationml/2006/main">
   <p:cSld>
     <p:spTree>
@@ -4201,7 +4404,7 @@
 </p:sld>
 </file>
 
-<file path=ppt/slides/slide14.xml><?xml version="1.0" encoding="utf-8"?>
+<file path=ppt/slides/slide13.xml><?xml version="1.0" encoding="utf-8"?>
 <p:sld xmlns:a="http://schemas.openxmlformats.org/drawingml/2006/main" xmlns:r="http://schemas.openxmlformats.org/officeDocument/2006/relationships" xmlns:p="http://schemas.openxmlformats.org/presentationml/2006/main">
   <p:cSld>
     <p:spTree>
@@ -4248,7 +4451,7 @@
           <a:p>
             <a:r>
               <a:rPr lang="en-CA" dirty="0"/>
-              <a:t>Generator &amp; Discriminator:</a:t>
+              <a:t>GAN structure - Generator &amp; Discriminator:</a:t>
             </a:r>
           </a:p>
         </p:txBody>
@@ -4360,7 +4563,7 @@
 </p:sld>
 </file>
 
-<file path=ppt/slides/slide15.xml><?xml version="1.0" encoding="utf-8"?>
+<file path=ppt/slides/slide14.xml><?xml version="1.0" encoding="utf-8"?>
 <p:sld xmlns:a="http://schemas.openxmlformats.org/drawingml/2006/main" xmlns:r="http://schemas.openxmlformats.org/officeDocument/2006/relationships" xmlns:p="http://schemas.openxmlformats.org/presentationml/2006/main">
   <p:cSld>
     <p:spTree>
@@ -4490,6 +4693,102 @@
     <p:extLst>
       <p:ext uri="{BB962C8B-B14F-4D97-AF65-F5344CB8AC3E}">
         <p14:creationId xmlns:p14="http://schemas.microsoft.com/office/powerpoint/2010/main" val="1834437852"/>
+      </p:ext>
+    </p:extLst>
+  </p:cSld>
+  <p:clrMapOvr>
+    <a:masterClrMapping/>
+  </p:clrMapOvr>
+</p:sld>
+</file>
+
+<file path=ppt/slides/slide15.xml><?xml version="1.0" encoding="utf-8"?>
+<p:sld xmlns:a="http://schemas.openxmlformats.org/drawingml/2006/main" xmlns:r="http://schemas.openxmlformats.org/officeDocument/2006/relationships" xmlns:p="http://schemas.openxmlformats.org/presentationml/2006/main">
+  <p:cSld>
+    <p:spTree>
+      <p:nvGrpSpPr>
+        <p:cNvPr id="1" name=""/>
+        <p:cNvGrpSpPr/>
+        <p:nvPr/>
+      </p:nvGrpSpPr>
+      <p:grpSpPr>
+        <a:xfrm>
+          <a:off x="0" y="0"/>
+          <a:ext cx="0" cy="0"/>
+          <a:chOff x="0" y="0"/>
+          <a:chExt cx="0" cy="0"/>
+        </a:xfrm>
+      </p:grpSpPr>
+      <p:pic>
+        <p:nvPicPr>
+          <p:cNvPr id="4" name="Picture 3">
+            <a:extLst>
+              <a:ext uri="{FF2B5EF4-FFF2-40B4-BE49-F238E27FC236}">
+                <a16:creationId xmlns:a16="http://schemas.microsoft.com/office/drawing/2014/main" id="{A7F0E624-6A8B-43DC-AF97-38CA30940C93}"/>
+              </a:ext>
+            </a:extLst>
+          </p:cNvPr>
+          <p:cNvPicPr>
+            <a:picLocks noChangeAspect="1"/>
+          </p:cNvPicPr>
+          <p:nvPr/>
+        </p:nvPicPr>
+        <p:blipFill>
+          <a:blip r:embed="rId2"/>
+          <a:stretch>
+            <a:fillRect/>
+          </a:stretch>
+        </p:blipFill>
+        <p:spPr>
+          <a:xfrm>
+            <a:off x="0" y="1310220"/>
+            <a:ext cx="12192000" cy="4323288"/>
+          </a:xfrm>
+          <a:prstGeom prst="rect">
+            <a:avLst/>
+          </a:prstGeom>
+        </p:spPr>
+      </p:pic>
+      <p:sp>
+        <p:nvSpPr>
+          <p:cNvPr id="2" name="TextBox 1">
+            <a:extLst>
+              <a:ext uri="{FF2B5EF4-FFF2-40B4-BE49-F238E27FC236}">
+                <a16:creationId xmlns:a16="http://schemas.microsoft.com/office/drawing/2014/main" id="{FA1173C7-42D2-5D46-BB89-6324A686A6B5}"/>
+              </a:ext>
+            </a:extLst>
+          </p:cNvPr>
+          <p:cNvSpPr txBox="1"/>
+          <p:nvPr/>
+        </p:nvSpPr>
+        <p:spPr>
+          <a:xfrm>
+            <a:off x="285750" y="357190"/>
+            <a:ext cx="6602641" cy="707886"/>
+          </a:xfrm>
+          <a:prstGeom prst="rect">
+            <a:avLst/>
+          </a:prstGeom>
+          <a:noFill/>
+        </p:spPr>
+        <p:txBody>
+          <a:bodyPr wrap="none" rtlCol="0">
+            <a:spAutoFit/>
+          </a:bodyPr>
+          <a:lstStyle/>
+          <a:p>
+            <a:r>
+              <a:rPr lang="en-CA" sz="4000" dirty="0"/>
+              <a:t>Single Image Super Resolution:</a:t>
+            </a:r>
+            <a:endParaRPr lang="en-US" sz="4000" dirty="0"/>
+          </a:p>
+        </p:txBody>
+      </p:sp>
+    </p:spTree>
+    <p:extLst>
+      <p:ext uri="{BB962C8B-B14F-4D97-AF65-F5344CB8AC3E}">
+        <p14:creationId xmlns:p14="http://schemas.microsoft.com/office/powerpoint/2010/main" val="60648957"/>
       </p:ext>
     </p:extLst>
   </p:cSld>
@@ -4649,40 +4948,95 @@
           <a:chExt cx="0" cy="0"/>
         </a:xfrm>
       </p:grpSpPr>
-      <p:pic>
-        <p:nvPicPr>
-          <p:cNvPr id="4" name="Picture 3">
-            <a:extLst>
-              <a:ext uri="{FF2B5EF4-FFF2-40B4-BE49-F238E27FC236}">
-                <a16:creationId xmlns:a16="http://schemas.microsoft.com/office/drawing/2014/main" id="{A7F0E624-6A8B-43DC-AF97-38CA30940C93}"/>
-              </a:ext>
-            </a:extLst>
-          </p:cNvPr>
-          <p:cNvPicPr>
-            <a:picLocks noChangeAspect="1"/>
-          </p:cNvPicPr>
-          <p:nvPr/>
-        </p:nvPicPr>
-        <p:blipFill>
-          <a:blip r:embed="rId2"/>
-          <a:stretch>
-            <a:fillRect/>
-          </a:stretch>
-        </p:blipFill>
-        <p:spPr>
-          <a:xfrm>
-            <a:off x="0" y="1267356"/>
-            <a:ext cx="12192000" cy="4323288"/>
-          </a:xfrm>
-          <a:prstGeom prst="rect">
-            <a:avLst/>
-          </a:prstGeom>
-        </p:spPr>
-      </p:pic>
+      <p:sp>
+        <p:nvSpPr>
+          <p:cNvPr id="2" name="Title 1">
+            <a:extLst>
+              <a:ext uri="{FF2B5EF4-FFF2-40B4-BE49-F238E27FC236}">
+                <a16:creationId xmlns:a16="http://schemas.microsoft.com/office/drawing/2014/main" id="{18F96890-9B86-1149-B4A6-52C769256945}"/>
+              </a:ext>
+            </a:extLst>
+          </p:cNvPr>
+          <p:cNvSpPr>
+            <a:spLocks noGrp="1"/>
+          </p:cNvSpPr>
+          <p:nvPr>
+            <p:ph type="title"/>
+          </p:nvPr>
+        </p:nvSpPr>
+        <p:spPr/>
+        <p:txBody>
+          <a:bodyPr/>
+          <a:lstStyle/>
+          <a:p>
+            <a:r>
+              <a:rPr lang="en-US" dirty="0"/>
+              <a:t>Data Source</a:t>
+            </a:r>
+          </a:p>
+        </p:txBody>
+      </p:sp>
+      <p:sp>
+        <p:nvSpPr>
+          <p:cNvPr id="3" name="Content Placeholder 2">
+            <a:extLst>
+              <a:ext uri="{FF2B5EF4-FFF2-40B4-BE49-F238E27FC236}">
+                <a16:creationId xmlns:a16="http://schemas.microsoft.com/office/drawing/2014/main" id="{1E31E60E-ED31-7E47-B696-A9FA64926521}"/>
+              </a:ext>
+            </a:extLst>
+          </p:cNvPr>
+          <p:cNvSpPr>
+            <a:spLocks noGrp="1"/>
+          </p:cNvSpPr>
+          <p:nvPr>
+            <p:ph idx="1"/>
+          </p:nvPr>
+        </p:nvSpPr>
+        <p:spPr/>
+        <p:txBody>
+          <a:bodyPr/>
+          <a:lstStyle/>
+          <a:p>
+            <a:r>
+              <a:rPr lang="en-US" dirty="0"/>
+              <a:t>We could easily find datasets of images online and apply B/W filter to create desired B/W images. </a:t>
+            </a:r>
+          </a:p>
+          <a:p>
+            <a:r>
+              <a:rPr lang="en-US" dirty="0"/>
+              <a:t>Example image dataset includes:</a:t>
+            </a:r>
+          </a:p>
+          <a:p>
+            <a:pPr lvl="1"/>
+            <a:r>
+              <a:rPr lang="en-US" dirty="0"/>
+              <a:t>ImageNet: 1.5M images</a:t>
+            </a:r>
+          </a:p>
+          <a:p>
+            <a:pPr lvl="1"/>
+            <a:r>
+              <a:rPr lang="en-US" dirty="0"/>
+              <a:t>Open images dataset: 9M images</a:t>
+            </a:r>
+          </a:p>
+          <a:p>
+            <a:endParaRPr lang="en-US" dirty="0"/>
+          </a:p>
+          <a:p>
+            <a:endParaRPr lang="en-US" dirty="0"/>
+          </a:p>
+          <a:p>
+            <a:endParaRPr lang="en-US" dirty="0"/>
+          </a:p>
+        </p:txBody>
+      </p:sp>
     </p:spTree>
     <p:extLst>
       <p:ext uri="{BB962C8B-B14F-4D97-AF65-F5344CB8AC3E}">
-        <p14:creationId xmlns:p14="http://schemas.microsoft.com/office/powerpoint/2010/main" val="60648957"/>
+        <p14:creationId xmlns:p14="http://schemas.microsoft.com/office/powerpoint/2010/main" val="1523085169"/>
       </p:ext>
     </p:extLst>
   </p:cSld>
@@ -4732,7 +5086,7 @@
           <a:p>
             <a:r>
               <a:rPr lang="en-CA" dirty="0"/>
-              <a:t>Problems:</a:t>
+              <a:t>Challenges</a:t>
             </a:r>
           </a:p>
         </p:txBody>
@@ -4760,7 +5114,7 @@
           <a:p>
             <a:r>
               <a:rPr lang="en-CA" dirty="0"/>
-              <a:t>Color restoration favors Blue colors</a:t>
+              <a:t>Color restoration favors Blue colors (might be biases from dataset)</a:t>
             </a:r>
           </a:p>
           <a:p>
@@ -4781,6 +5135,89 @@
     <p:extLst>
       <p:ext uri="{BB962C8B-B14F-4D97-AF65-F5344CB8AC3E}">
         <p14:creationId xmlns:p14="http://schemas.microsoft.com/office/powerpoint/2010/main" val="3247539159"/>
+      </p:ext>
+    </p:extLst>
+  </p:cSld>
+  <p:clrMapOvr>
+    <a:masterClrMapping/>
+  </p:clrMapOvr>
+</p:sld>
+</file>
+
+<file path=ppt/slides/slide19.xml><?xml version="1.0" encoding="utf-8"?>
+<p:sld xmlns:a="http://schemas.openxmlformats.org/drawingml/2006/main" xmlns:r="http://schemas.openxmlformats.org/officeDocument/2006/relationships" xmlns:p="http://schemas.openxmlformats.org/presentationml/2006/main">
+  <p:cSld>
+    <p:spTree>
+      <p:nvGrpSpPr>
+        <p:cNvPr id="1" name=""/>
+        <p:cNvGrpSpPr/>
+        <p:nvPr/>
+      </p:nvGrpSpPr>
+      <p:grpSpPr>
+        <a:xfrm>
+          <a:off x="0" y="0"/>
+          <a:ext cx="0" cy="0"/>
+          <a:chOff x="0" y="0"/>
+          <a:chExt cx="0" cy="0"/>
+        </a:xfrm>
+      </p:grpSpPr>
+      <p:sp>
+        <p:nvSpPr>
+          <p:cNvPr id="2" name="Title 1">
+            <a:extLst>
+              <a:ext uri="{FF2B5EF4-FFF2-40B4-BE49-F238E27FC236}">
+                <a16:creationId xmlns:a16="http://schemas.microsoft.com/office/drawing/2014/main" id="{C564A388-824A-8D40-8739-68A650B6F72C}"/>
+              </a:ext>
+            </a:extLst>
+          </p:cNvPr>
+          <p:cNvSpPr>
+            <a:spLocks noGrp="1"/>
+          </p:cNvSpPr>
+          <p:nvPr>
+            <p:ph type="title"/>
+          </p:nvPr>
+        </p:nvSpPr>
+        <p:spPr/>
+        <p:txBody>
+          <a:bodyPr/>
+          <a:lstStyle/>
+          <a:p>
+            <a:r>
+              <a:rPr lang="en-US" dirty="0"/>
+              <a:t>Thanks.</a:t>
+            </a:r>
+          </a:p>
+        </p:txBody>
+      </p:sp>
+      <p:sp>
+        <p:nvSpPr>
+          <p:cNvPr id="3" name="Content Placeholder 2">
+            <a:extLst>
+              <a:ext uri="{FF2B5EF4-FFF2-40B4-BE49-F238E27FC236}">
+                <a16:creationId xmlns:a16="http://schemas.microsoft.com/office/drawing/2014/main" id="{0B3E9BB3-9184-F242-BF85-FD03E1060694}"/>
+              </a:ext>
+            </a:extLst>
+          </p:cNvPr>
+          <p:cNvSpPr>
+            <a:spLocks noGrp="1"/>
+          </p:cNvSpPr>
+          <p:nvPr>
+            <p:ph idx="1"/>
+          </p:nvPr>
+        </p:nvSpPr>
+        <p:spPr/>
+        <p:txBody>
+          <a:bodyPr/>
+          <a:lstStyle/>
+          <a:p>
+            <a:endParaRPr lang="en-US"/>
+          </a:p>
+        </p:txBody>
+      </p:sp>
+    </p:spTree>
+    <p:extLst>
+      <p:ext uri="{BB962C8B-B14F-4D97-AF65-F5344CB8AC3E}">
+        <p14:creationId xmlns:p14="http://schemas.microsoft.com/office/powerpoint/2010/main" val="3888328012"/>
       </p:ext>
     </p:extLst>
   </p:cSld>
@@ -4807,19 +5244,56 @@
           <a:chExt cx="0" cy="0"/>
         </a:xfrm>
       </p:grpSpPr>
+      <p:sp>
+        <p:nvSpPr>
+          <p:cNvPr id="2" name="Title 1">
+            <a:extLst>
+              <a:ext uri="{FF2B5EF4-FFF2-40B4-BE49-F238E27FC236}">
+                <a16:creationId xmlns:a16="http://schemas.microsoft.com/office/drawing/2014/main" id="{42981A0C-B5E6-4708-B592-205E5FF8F57B}"/>
+              </a:ext>
+            </a:extLst>
+          </p:cNvPr>
+          <p:cNvSpPr>
+            <a:spLocks noGrp="1"/>
+          </p:cNvSpPr>
+          <p:nvPr>
+            <p:ph type="title"/>
+          </p:nvPr>
+        </p:nvSpPr>
+        <p:spPr>
+          <a:xfrm>
+            <a:off x="838200" y="365126"/>
+            <a:ext cx="10515600" cy="417300"/>
+          </a:xfrm>
+        </p:spPr>
+        <p:txBody>
+          <a:bodyPr>
+            <a:normAutofit fontScale="90000"/>
+          </a:bodyPr>
+          <a:lstStyle/>
+          <a:p>
+            <a:r>
+              <a:rPr lang="en-CA" dirty="0"/>
+              <a:t>Training Structure:</a:t>
+            </a:r>
+          </a:p>
+        </p:txBody>
+      </p:sp>
       <p:pic>
         <p:nvPicPr>
-          <p:cNvPr id="4" name="Picture 3">
-            <a:extLst>
-              <a:ext uri="{FF2B5EF4-FFF2-40B4-BE49-F238E27FC236}">
-                <a16:creationId xmlns:a16="http://schemas.microsoft.com/office/drawing/2014/main" id="{D57D3087-ADB4-445A-8E1B-E28C47F38395}"/>
+          <p:cNvPr id="7" name="Content Placeholder 6">
+            <a:extLst>
+              <a:ext uri="{FF2B5EF4-FFF2-40B4-BE49-F238E27FC236}">
+                <a16:creationId xmlns:a16="http://schemas.microsoft.com/office/drawing/2014/main" id="{FC03459A-A593-4F80-92B1-61C228FD06F0}"/>
               </a:ext>
             </a:extLst>
           </p:cNvPr>
           <p:cNvPicPr>
-            <a:picLocks noChangeAspect="1"/>
+            <a:picLocks noGrp="1" noChangeAspect="1"/>
           </p:cNvPicPr>
-          <p:nvPr/>
+          <p:nvPr>
+            <p:ph idx="1"/>
+          </p:nvPr>
         </p:nvPicPr>
         <p:blipFill>
           <a:blip r:embed="rId2"/>
@@ -4829,18 +5303,89 @@
         </p:blipFill>
         <p:spPr>
           <a:xfrm>
-            <a:off x="3128962" y="1066800"/>
-            <a:ext cx="5934075" cy="4724400"/>
+            <a:off x="0" y="782426"/>
+            <a:ext cx="7410235" cy="6075574"/>
           </a:xfrm>
           <a:prstGeom prst="rect">
             <a:avLst/>
           </a:prstGeom>
         </p:spPr>
       </p:pic>
+      <p:sp>
+        <p:nvSpPr>
+          <p:cNvPr id="9" name="TextBox 8">
+            <a:extLst>
+              <a:ext uri="{FF2B5EF4-FFF2-40B4-BE49-F238E27FC236}">
+                <a16:creationId xmlns:a16="http://schemas.microsoft.com/office/drawing/2014/main" id="{65F8D375-4A23-4909-BBBC-8152C67D600C}"/>
+              </a:ext>
+            </a:extLst>
+          </p:cNvPr>
+          <p:cNvSpPr txBox="1"/>
+          <p:nvPr/>
+        </p:nvSpPr>
+        <p:spPr>
+          <a:xfrm>
+            <a:off x="7195385" y="1166842"/>
+            <a:ext cx="4996615" cy="4247317"/>
+          </a:xfrm>
+          <a:prstGeom prst="rect">
+            <a:avLst/>
+          </a:prstGeom>
+          <a:noFill/>
+        </p:spPr>
+        <p:txBody>
+          <a:bodyPr wrap="square" rtlCol="0">
+            <a:spAutoFit/>
+          </a:bodyPr>
+          <a:lstStyle/>
+          <a:p>
+            <a:r>
+              <a:rPr lang="en-CA" dirty="0"/>
+              <a:t>The architecture flow is that, the data preprocessor reads the dataset corpuses, and</a:t>
+            </a:r>
+          </a:p>
+          <a:p>
+            <a:r>
+              <a:rPr lang="en-CA" dirty="0"/>
+              <a:t>converts them into Question and Answer style, so it will be able to use it later as</a:t>
+            </a:r>
+          </a:p>
+          <a:p>
+            <a:r>
+              <a:rPr lang="en-CA" dirty="0"/>
+              <a:t>training instances, and then it passes these instances to the data manipulator which</a:t>
+            </a:r>
+          </a:p>
+          <a:p>
+            <a:r>
+              <a:rPr lang="en-CA" dirty="0"/>
+              <a:t>encodes these sequences using the word embeddings made by Google in 2015. The</a:t>
+            </a:r>
+          </a:p>
+          <a:p>
+            <a:r>
+              <a:rPr lang="en-CA" dirty="0"/>
+              <a:t>model then call the training module to train itself on the encoded dataset, and try to</a:t>
+            </a:r>
+          </a:p>
+          <a:p>
+            <a:r>
+              <a:rPr lang="en-CA" dirty="0"/>
+              <a:t>adapt the weights of the model in order to make it better and more accurate in the generalization phase, then it saves the weights in a file to read them back while</a:t>
+            </a:r>
+          </a:p>
+          <a:p>
+            <a:r>
+              <a:rPr lang="en-CA" dirty="0"/>
+              <a:t>testing.</a:t>
+            </a:r>
+          </a:p>
+        </p:txBody>
+      </p:sp>
     </p:spTree>
     <p:extLst>
       <p:ext uri="{BB962C8B-B14F-4D97-AF65-F5344CB8AC3E}">
-        <p14:creationId xmlns:p14="http://schemas.microsoft.com/office/powerpoint/2010/main" val="1023296628"/>
+        <p14:creationId xmlns:p14="http://schemas.microsoft.com/office/powerpoint/2010/main" val="999827896"/>
       </p:ext>
     </p:extLst>
   </p:cSld>
@@ -4897,17 +5442,17 @@
           <a:p>
             <a:r>
               <a:rPr lang="en-CA" dirty="0"/>
-              <a:t>Training Structure:</a:t>
+              <a:t>Testing Structure:</a:t>
             </a:r>
           </a:p>
         </p:txBody>
       </p:sp>
       <p:pic>
         <p:nvPicPr>
-          <p:cNvPr id="7" name="Content Placeholder 6">
-            <a:extLst>
-              <a:ext uri="{FF2B5EF4-FFF2-40B4-BE49-F238E27FC236}">
-                <a16:creationId xmlns:a16="http://schemas.microsoft.com/office/drawing/2014/main" id="{FC03459A-A593-4F80-92B1-61C228FD06F0}"/>
+          <p:cNvPr id="5" name="Content Placeholder 4">
+            <a:extLst>
+              <a:ext uri="{FF2B5EF4-FFF2-40B4-BE49-F238E27FC236}">
+                <a16:creationId xmlns:a16="http://schemas.microsoft.com/office/drawing/2014/main" id="{E84FF96F-528E-42D3-9F75-A61C39605F8A}"/>
               </a:ext>
             </a:extLst>
           </p:cNvPr>
@@ -4927,7 +5472,7 @@
         <p:spPr>
           <a:xfrm>
             <a:off x="0" y="782426"/>
-            <a:ext cx="7410235" cy="6075574"/>
+            <a:ext cx="7195385" cy="6075574"/>
           </a:xfrm>
           <a:prstGeom prst="rect">
             <a:avLst/>
@@ -4936,10 +5481,10 @@
       </p:pic>
       <p:sp>
         <p:nvSpPr>
-          <p:cNvPr id="9" name="TextBox 8">
-            <a:extLst>
-              <a:ext uri="{FF2B5EF4-FFF2-40B4-BE49-F238E27FC236}">
-                <a16:creationId xmlns:a16="http://schemas.microsoft.com/office/drawing/2014/main" id="{65F8D375-4A23-4909-BBBC-8152C67D600C}"/>
+          <p:cNvPr id="6" name="TextBox 5">
+            <a:extLst>
+              <a:ext uri="{FF2B5EF4-FFF2-40B4-BE49-F238E27FC236}">
+                <a16:creationId xmlns:a16="http://schemas.microsoft.com/office/drawing/2014/main" id="{EF29B589-42FE-44FA-8B59-B6819691C332}"/>
               </a:ext>
             </a:extLst>
           </p:cNvPr>
@@ -4948,8 +5493,8 @@
         </p:nvSpPr>
         <p:spPr>
           <a:xfrm>
-            <a:off x="7195385" y="1166842"/>
-            <a:ext cx="4996615" cy="4247317"/>
+            <a:off x="7195385" y="1983247"/>
+            <a:ext cx="4996615" cy="2891505"/>
           </a:xfrm>
           <a:prstGeom prst="rect">
             <a:avLst/>
@@ -4964,43 +5509,31 @@
           <a:p>
             <a:r>
               <a:rPr lang="en-CA" dirty="0"/>
-              <a:t>The architecture flow is that, the data preprocessor reads the dataset corpuses, and</a:t>
+              <a:t>The architecture flow is that, the website (the UI) receives a query (after logging in</a:t>
             </a:r>
           </a:p>
           <a:p>
             <a:r>
               <a:rPr lang="en-CA" dirty="0"/>
-              <a:t>converts them into Question and Answer style, so it will be able to use it later as</a:t>
+              <a:t>and so), the interface send this query to the data manipulator to encode it, then it</a:t>
             </a:r>
           </a:p>
           <a:p>
             <a:r>
               <a:rPr lang="en-CA" dirty="0"/>
-              <a:t>training instances, and then it passes these instances to the data manipulator which</a:t>
+              <a:t>send this encoded query to the model which calls the tester, the tester loads the</a:t>
             </a:r>
           </a:p>
           <a:p>
             <a:r>
               <a:rPr lang="en-CA" dirty="0"/>
-              <a:t>encodes these sequences using the word embeddings made by Google in 2015. The</a:t>
+              <a:t>saved model which is the weights of the model, and use these weights to generate</a:t>
             </a:r>
           </a:p>
           <a:p>
             <a:r>
               <a:rPr lang="en-CA" dirty="0"/>
-              <a:t>model then call the training module to train itself on the encoded dataset, and try to</a:t>
-            </a:r>
-          </a:p>
-          <a:p>
-            <a:r>
-              <a:rPr lang="en-CA" dirty="0"/>
-              <a:t>adapt the weights of the model in order to make it better and more accurate in the generalization phase, then it saves the weights in a file to read them back while</a:t>
-            </a:r>
-          </a:p>
-          <a:p>
-            <a:r>
-              <a:rPr lang="en-CA" dirty="0"/>
-              <a:t>testing.</a:t>
+              <a:t>the answer for this query, then it decodes the answer into words.</a:t>
             </a:r>
           </a:p>
         </p:txBody>
@@ -5008,7 +5541,7 @@
     </p:spTree>
     <p:extLst>
       <p:ext uri="{BB962C8B-B14F-4D97-AF65-F5344CB8AC3E}">
-        <p14:creationId xmlns:p14="http://schemas.microsoft.com/office/powerpoint/2010/main" val="999827896"/>
+        <p14:creationId xmlns:p14="http://schemas.microsoft.com/office/powerpoint/2010/main" val="779116505"/>
       </p:ext>
     </p:extLst>
   </p:cSld>
@@ -5053,7 +5586,7 @@
         </p:nvSpPr>
         <p:spPr>
           <a:xfrm>
-            <a:off x="838200" y="365126"/>
+            <a:off x="788773" y="3343920"/>
             <a:ext cx="10515600" cy="417300"/>
           </a:xfrm>
         </p:spPr>
@@ -5065,49 +5598,70 @@
           <a:p>
             <a:r>
               <a:rPr lang="en-CA" dirty="0"/>
-              <a:t>Testing Structure:</a:t>
-            </a:r>
-          </a:p>
-        </p:txBody>
-      </p:sp>
-      <p:pic>
-        <p:nvPicPr>
-          <p:cNvPr id="5" name="Content Placeholder 4">
-            <a:extLst>
-              <a:ext uri="{FF2B5EF4-FFF2-40B4-BE49-F238E27FC236}">
-                <a16:creationId xmlns:a16="http://schemas.microsoft.com/office/drawing/2014/main" id="{E84FF96F-528E-42D3-9F75-A61C39605F8A}"/>
-              </a:ext>
-            </a:extLst>
-          </p:cNvPr>
-          <p:cNvPicPr>
-            <a:picLocks noGrp="1" noChangeAspect="1"/>
-          </p:cNvPicPr>
+              <a:t>Feature Selection:</a:t>
+            </a:r>
+          </a:p>
+        </p:txBody>
+      </p:sp>
+      <p:sp>
+        <p:nvSpPr>
+          <p:cNvPr id="4" name="Content Placeholder 3">
+            <a:extLst>
+              <a:ext uri="{FF2B5EF4-FFF2-40B4-BE49-F238E27FC236}">
+                <a16:creationId xmlns:a16="http://schemas.microsoft.com/office/drawing/2014/main" id="{DACDC7C0-DC09-4AEC-92E2-0608F5AABA63}"/>
+              </a:ext>
+            </a:extLst>
+          </p:cNvPr>
+          <p:cNvSpPr>
+            <a:spLocks noGrp="1"/>
+          </p:cNvSpPr>
           <p:nvPr>
             <p:ph idx="1"/>
           </p:nvPr>
-        </p:nvPicPr>
-        <p:blipFill>
-          <a:blip r:embed="rId2"/>
-          <a:stretch>
-            <a:fillRect/>
-          </a:stretch>
-        </p:blipFill>
+        </p:nvSpPr>
         <p:spPr>
           <a:xfrm>
-            <a:off x="0" y="782426"/>
-            <a:ext cx="7195385" cy="6075574"/>
+            <a:off x="739346" y="3909433"/>
+            <a:ext cx="10515600" cy="2175669"/>
           </a:xfrm>
-          <a:prstGeom prst="rect">
-            <a:avLst/>
-          </a:prstGeom>
         </p:spPr>
-      </p:pic>
-      <p:sp>
-        <p:nvSpPr>
-          <p:cNvPr id="6" name="TextBox 5">
-            <a:extLst>
-              <a:ext uri="{FF2B5EF4-FFF2-40B4-BE49-F238E27FC236}">
-                <a16:creationId xmlns:a16="http://schemas.microsoft.com/office/drawing/2014/main" id="{EF29B589-42FE-44FA-8B59-B6819691C332}"/>
+        <p:txBody>
+          <a:bodyPr>
+            <a:normAutofit/>
+          </a:bodyPr>
+          <a:lstStyle/>
+          <a:p>
+            <a:r>
+              <a:rPr lang="en-CA" sz="2400" dirty="0"/>
+              <a:t>N-grams: used to find probability of sentence S</a:t>
+            </a:r>
+          </a:p>
+          <a:p>
+            <a:r>
+              <a:rPr lang="en-CA" sz="2400" dirty="0"/>
+              <a:t>Word Classes: similar words appear in similar context</a:t>
+            </a:r>
+          </a:p>
+          <a:p>
+            <a:r>
+              <a:rPr lang="en-CA" sz="2400" dirty="0"/>
+              <a:t>Bag of Words: word frequency vector </a:t>
+            </a:r>
+          </a:p>
+          <a:p>
+            <a:r>
+              <a:rPr lang="en-CA" sz="2400" dirty="0"/>
+              <a:t>Word2Vec: similar words have close word vector</a:t>
+            </a:r>
+          </a:p>
+        </p:txBody>
+      </p:sp>
+      <p:sp>
+        <p:nvSpPr>
+          <p:cNvPr id="3" name="TextBox 2">
+            <a:extLst>
+              <a:ext uri="{FF2B5EF4-FFF2-40B4-BE49-F238E27FC236}">
+                <a16:creationId xmlns:a16="http://schemas.microsoft.com/office/drawing/2014/main" id="{FE348B13-3B6B-5A43-B0FF-3EA9C87BE5F1}"/>
               </a:ext>
             </a:extLst>
           </p:cNvPr>
@@ -5116,8 +5670,8 @@
         </p:nvSpPr>
         <p:spPr>
           <a:xfrm>
-            <a:off x="7195385" y="1983247"/>
-            <a:ext cx="4996615" cy="2891505"/>
+            <a:off x="739346" y="476335"/>
+            <a:ext cx="10614454" cy="2554545"/>
           </a:xfrm>
           <a:prstGeom prst="rect">
             <a:avLst/>
@@ -5131,32 +5685,52 @@
           <a:lstStyle/>
           <a:p>
             <a:r>
-              <a:rPr lang="en-CA" dirty="0"/>
-              <a:t>The architecture flow is that, the website (the UI) receives a query (after logging in</a:t>
-            </a:r>
-          </a:p>
-          <a:p>
-            <a:r>
-              <a:rPr lang="en-CA" dirty="0"/>
-              <a:t>and so), the interface send this query to the data manipulator to encode it, then it</a:t>
-            </a:r>
-          </a:p>
-          <a:p>
-            <a:r>
-              <a:rPr lang="en-CA" dirty="0"/>
-              <a:t>send this encoded query to the model which calls the tester, the tester loads the</a:t>
-            </a:r>
-          </a:p>
-          <a:p>
-            <a:r>
-              <a:rPr lang="en-CA" dirty="0"/>
-              <a:t>saved model which is the weights of the model, and use these weights to generate</a:t>
-            </a:r>
-          </a:p>
-          <a:p>
-            <a:r>
-              <a:rPr lang="en-CA" dirty="0"/>
-              <a:t>the answer for this query, then it decodes the answer into words.</a:t>
+              <a:rPr lang="en-CA" sz="4000" dirty="0">
+                <a:latin typeface="+mj-lt"/>
+              </a:rPr>
+              <a:t>Data source:</a:t>
+            </a:r>
+          </a:p>
+          <a:p>
+            <a:pPr marL="285750" indent="-285750">
+              <a:buFont typeface="Arial" panose="020B0604020202020204" pitchFamily="34" charset="0"/>
+              <a:buChar char="•"/>
+            </a:pPr>
+            <a:r>
+              <a:rPr lang="en-US" sz="2400" dirty="0"/>
+              <a:t>Cornell Movie-Dialogs Corpus:</a:t>
+            </a:r>
+          </a:p>
+          <a:p>
+            <a:r>
+              <a:rPr lang="en-US" sz="2400" dirty="0"/>
+              <a:t>	220,579 conversational exchanges between 10,292 pairs of movie characters</a:t>
+            </a:r>
+          </a:p>
+          <a:p>
+            <a:pPr marL="285750" indent="-285750">
+              <a:buFont typeface="Arial" panose="020B0604020202020204" pitchFamily="34" charset="0"/>
+              <a:buChar char="•"/>
+            </a:pPr>
+            <a:r>
+              <a:rPr lang="en-US" sz="2400" dirty="0" err="1"/>
+              <a:t>OpenSubtitles</a:t>
+            </a:r>
+            <a:r>
+              <a:rPr lang="en-US" sz="2400" dirty="0"/>
+              <a:t> dataset:</a:t>
+            </a:r>
+          </a:p>
+          <a:p>
+            <a:r>
+              <a:rPr lang="en-US" sz="2400" dirty="0"/>
+              <a:t>	total number of sentence fragments: 3.35G</a:t>
+            </a:r>
+          </a:p>
+          <a:p>
+            <a:r>
+              <a:rPr lang="en-US" sz="2400" dirty="0"/>
+              <a:t>And more</a:t>
             </a:r>
           </a:p>
         </p:txBody>
@@ -5164,7 +5738,7 @@
     </p:spTree>
     <p:extLst>
       <p:ext uri="{BB962C8B-B14F-4D97-AF65-F5344CB8AC3E}">
-        <p14:creationId xmlns:p14="http://schemas.microsoft.com/office/powerpoint/2010/main" val="779116505"/>
+        <p14:creationId xmlns:p14="http://schemas.microsoft.com/office/powerpoint/2010/main" val="713200134"/>
       </p:ext>
     </p:extLst>
   </p:cSld>
@@ -5221,7 +5795,7 @@
           <a:p>
             <a:r>
               <a:rPr lang="en-CA" dirty="0"/>
-              <a:t>Feature Selection:</a:t>
+              <a:t>Context Recognition:</a:t>
             </a:r>
           </a:p>
         </p:txBody>
@@ -5244,35 +5818,73 @@
         </p:nvSpPr>
         <p:spPr>
           <a:xfrm>
-            <a:off x="838200" y="1253331"/>
-            <a:ext cx="10515600" cy="4351338"/>
+            <a:off x="838200" y="1253330"/>
+            <a:ext cx="10515600" cy="5147469"/>
           </a:xfrm>
         </p:spPr>
         <p:txBody>
-          <a:bodyPr/>
+          <a:bodyPr>
+            <a:normAutofit/>
+          </a:bodyPr>
           <a:lstStyle/>
           <a:p>
             <a:r>
               <a:rPr lang="en-CA" dirty="0"/>
-              <a:t>N-grams: used to find probability of sentence S</a:t>
-            </a:r>
+              <a:t>Choosing sentence headings: POS, dependency graph, NER, 4 steps of IE</a:t>
+            </a:r>
+          </a:p>
+          <a:p>
+            <a:endParaRPr lang="en-CA" dirty="0"/>
           </a:p>
           <a:p>
             <a:r>
               <a:rPr lang="en-CA" dirty="0"/>
-              <a:t>Word Classes: similar words appear in similar context</a:t>
-            </a:r>
-          </a:p>
-          <a:p>
+              <a:t>Finding similarities: </a:t>
+            </a:r>
+          </a:p>
+          <a:p>
+            <a:pPr marL="0" indent="0">
+              <a:buNone/>
+            </a:pPr>
             <a:r>
               <a:rPr lang="en-CA" dirty="0"/>
-              <a:t>Bag of Words: word frequency vector </a:t>
-            </a:r>
-          </a:p>
-          <a:p>
+              <a:t>-Word embedding</a:t>
+            </a:r>
+          </a:p>
+          <a:p>
+            <a:pPr marL="0" indent="0">
+              <a:buNone/>
+            </a:pPr>
             <a:r>
               <a:rPr lang="en-CA" dirty="0"/>
-              <a:t>Word2Vec: similar words have close word vector</a:t>
+              <a:t>-Word alignment</a:t>
+            </a:r>
+          </a:p>
+          <a:p>
+            <a:pPr marL="0" indent="0">
+              <a:buNone/>
+            </a:pPr>
+            <a:r>
+              <a:rPr lang="en-CA" dirty="0"/>
+              <a:t>-Word vector	</a:t>
+            </a:r>
+          </a:p>
+          <a:p>
+            <a:pPr marL="0" indent="0">
+              <a:buNone/>
+            </a:pPr>
+            <a:r>
+              <a:rPr lang="en-CA" dirty="0"/>
+              <a:t>-Continuous bag of words: predict certain word</a:t>
+            </a:r>
+          </a:p>
+          <a:p>
+            <a:pPr marL="0" indent="0">
+              <a:buNone/>
+            </a:pPr>
+            <a:r>
+              <a:rPr lang="en-CA" dirty="0"/>
+              <a:t>-Skip gram: predict word neighbors</a:t>
             </a:r>
           </a:p>
         </p:txBody>
@@ -5280,7 +5892,7 @@
     </p:spTree>
     <p:extLst>
       <p:ext uri="{BB962C8B-B14F-4D97-AF65-F5344CB8AC3E}">
-        <p14:creationId xmlns:p14="http://schemas.microsoft.com/office/powerpoint/2010/main" val="713200134"/>
+        <p14:creationId xmlns:p14="http://schemas.microsoft.com/office/powerpoint/2010/main" val="974763924"/>
       </p:ext>
     </p:extLst>
   </p:cSld>
@@ -5337,167 +5949,13 @@
           <a:p>
             <a:r>
               <a:rPr lang="en-CA" dirty="0"/>
-              <a:t>Context Recognition:</a:t>
-            </a:r>
-          </a:p>
-        </p:txBody>
-      </p:sp>
-      <p:sp>
-        <p:nvSpPr>
-          <p:cNvPr id="4" name="Content Placeholder 3">
-            <a:extLst>
-              <a:ext uri="{FF2B5EF4-FFF2-40B4-BE49-F238E27FC236}">
-                <a16:creationId xmlns:a16="http://schemas.microsoft.com/office/drawing/2014/main" id="{DACDC7C0-DC09-4AEC-92E2-0608F5AABA63}"/>
-              </a:ext>
-            </a:extLst>
-          </p:cNvPr>
-          <p:cNvSpPr>
-            <a:spLocks noGrp="1"/>
-          </p:cNvSpPr>
-          <p:nvPr>
-            <p:ph idx="1"/>
-          </p:nvPr>
-        </p:nvSpPr>
-        <p:spPr>
-          <a:xfrm>
-            <a:off x="838200" y="1253330"/>
-            <a:ext cx="10515600" cy="5147469"/>
-          </a:xfrm>
-        </p:spPr>
-        <p:txBody>
-          <a:bodyPr>
-            <a:normAutofit/>
-          </a:bodyPr>
-          <a:lstStyle/>
-          <a:p>
-            <a:r>
-              <a:rPr lang="en-CA" dirty="0"/>
-              <a:t>Choosing sentence headings: POS, dependency graph, NER, 4 steps of IE</a:t>
-            </a:r>
-          </a:p>
-          <a:p>
-            <a:endParaRPr lang="en-CA" dirty="0"/>
-          </a:p>
-          <a:p>
-            <a:r>
-              <a:rPr lang="en-CA" dirty="0"/>
-              <a:t>Finding similarities: </a:t>
-            </a:r>
-          </a:p>
-          <a:p>
-            <a:pPr marL="0" indent="0">
-              <a:buNone/>
-            </a:pPr>
-            <a:r>
-              <a:rPr lang="en-CA" dirty="0"/>
-              <a:t>-Word embedding</a:t>
-            </a:r>
-          </a:p>
-          <a:p>
-            <a:pPr marL="0" indent="0">
-              <a:buNone/>
-            </a:pPr>
-            <a:r>
-              <a:rPr lang="en-CA" dirty="0"/>
-              <a:t>-Word alignment</a:t>
-            </a:r>
-          </a:p>
-          <a:p>
-            <a:pPr marL="0" indent="0">
-              <a:buNone/>
-            </a:pPr>
-            <a:r>
-              <a:rPr lang="en-CA" dirty="0"/>
-              <a:t>-Word vector	</a:t>
-            </a:r>
-          </a:p>
-          <a:p>
-            <a:pPr marL="0" indent="0">
-              <a:buNone/>
-            </a:pPr>
-            <a:r>
-              <a:rPr lang="en-CA" dirty="0"/>
-              <a:t>-Continuous bag of words: predict certain word</a:t>
-            </a:r>
-          </a:p>
-          <a:p>
-            <a:pPr marL="0" indent="0">
-              <a:buNone/>
-            </a:pPr>
-            <a:r>
-              <a:rPr lang="en-CA" dirty="0"/>
-              <a:t>-Skip gram: predict word neighbors</a:t>
-            </a:r>
-          </a:p>
-        </p:txBody>
-      </p:sp>
-    </p:spTree>
-    <p:extLst>
-      <p:ext uri="{BB962C8B-B14F-4D97-AF65-F5344CB8AC3E}">
-        <p14:creationId xmlns:p14="http://schemas.microsoft.com/office/powerpoint/2010/main" val="974763924"/>
-      </p:ext>
-    </p:extLst>
-  </p:cSld>
-  <p:clrMapOvr>
-    <a:masterClrMapping/>
-  </p:clrMapOvr>
-</p:sld>
-</file>
-
-<file path=ppt/slides/slide7.xml><?xml version="1.0" encoding="utf-8"?>
-<p:sld xmlns:a="http://schemas.openxmlformats.org/drawingml/2006/main" xmlns:r="http://schemas.openxmlformats.org/officeDocument/2006/relationships" xmlns:p="http://schemas.openxmlformats.org/presentationml/2006/main">
-  <p:cSld>
-    <p:spTree>
-      <p:nvGrpSpPr>
-        <p:cNvPr id="1" name=""/>
-        <p:cNvGrpSpPr/>
-        <p:nvPr/>
-      </p:nvGrpSpPr>
-      <p:grpSpPr>
-        <a:xfrm>
-          <a:off x="0" y="0"/>
-          <a:ext cx="0" cy="0"/>
-          <a:chOff x="0" y="0"/>
-          <a:chExt cx="0" cy="0"/>
-        </a:xfrm>
-      </p:grpSpPr>
-      <p:sp>
-        <p:nvSpPr>
-          <p:cNvPr id="2" name="Title 1">
-            <a:extLst>
-              <a:ext uri="{FF2B5EF4-FFF2-40B4-BE49-F238E27FC236}">
-                <a16:creationId xmlns:a16="http://schemas.microsoft.com/office/drawing/2014/main" id="{42981A0C-B5E6-4708-B592-205E5FF8F57B}"/>
-              </a:ext>
-            </a:extLst>
-          </p:cNvPr>
-          <p:cNvSpPr>
-            <a:spLocks noGrp="1"/>
-          </p:cNvSpPr>
-          <p:nvPr>
-            <p:ph type="title"/>
-          </p:nvPr>
-        </p:nvSpPr>
-        <p:spPr>
-          <a:xfrm>
-            <a:off x="838200" y="365126"/>
-            <a:ext cx="10515600" cy="417300"/>
-          </a:xfrm>
-        </p:spPr>
-        <p:txBody>
-          <a:bodyPr>
-            <a:normAutofit fontScale="90000"/>
-          </a:bodyPr>
-          <a:lstStyle/>
-          <a:p>
-            <a:r>
-              <a:rPr lang="en-CA" dirty="0"/>
               <a:t>Word vector training:</a:t>
             </a:r>
           </a:p>
         </p:txBody>
       </p:sp>
-      <mc:AlternateContent xmlns:mc="http://schemas.openxmlformats.org/markup-compatibility/2006">
-        <mc:Choice xmlns:a14="http://schemas.microsoft.com/office/drawing/2010/main" Requires="a14">
+      <mc:AlternateContent xmlns:mc="http://schemas.openxmlformats.org/markup-compatibility/2006" xmlns:a14="http://schemas.microsoft.com/office/drawing/2010/main">
+        <mc:Choice Requires="a14">
           <p:sp>
             <p:nvSpPr>
               <p:cNvPr id="4" name="Content Placeholder 3">
@@ -5625,7 +6083,7 @@
             </p:txBody>
           </p:sp>
         </mc:Choice>
-        <mc:Fallback>
+        <mc:Fallback xmlns="">
           <p:sp>
             <p:nvSpPr>
               <p:cNvPr id="4" name="Content Placeholder 3">
@@ -5682,6 +6140,166 @@
 </p:sld>
 </file>
 
+<file path=ppt/slides/slide7.xml><?xml version="1.0" encoding="utf-8"?>
+<p:sld xmlns:a="http://schemas.openxmlformats.org/drawingml/2006/main" xmlns:r="http://schemas.openxmlformats.org/officeDocument/2006/relationships" xmlns:p="http://schemas.openxmlformats.org/presentationml/2006/main">
+  <p:cSld>
+    <p:spTree>
+      <p:nvGrpSpPr>
+        <p:cNvPr id="1" name=""/>
+        <p:cNvGrpSpPr/>
+        <p:nvPr/>
+      </p:nvGrpSpPr>
+      <p:grpSpPr>
+        <a:xfrm>
+          <a:off x="0" y="0"/>
+          <a:ext cx="0" cy="0"/>
+          <a:chOff x="0" y="0"/>
+          <a:chExt cx="0" cy="0"/>
+        </a:xfrm>
+      </p:grpSpPr>
+      <p:sp>
+        <p:nvSpPr>
+          <p:cNvPr id="2" name="Title 1">
+            <a:extLst>
+              <a:ext uri="{FF2B5EF4-FFF2-40B4-BE49-F238E27FC236}">
+                <a16:creationId xmlns:a16="http://schemas.microsoft.com/office/drawing/2014/main" id="{42981A0C-B5E6-4708-B592-205E5FF8F57B}"/>
+              </a:ext>
+            </a:extLst>
+          </p:cNvPr>
+          <p:cNvSpPr>
+            <a:spLocks noGrp="1"/>
+          </p:cNvSpPr>
+          <p:nvPr>
+            <p:ph type="title"/>
+          </p:nvPr>
+        </p:nvSpPr>
+        <p:spPr>
+          <a:xfrm>
+            <a:off x="838200" y="365126"/>
+            <a:ext cx="10515600" cy="417300"/>
+          </a:xfrm>
+        </p:spPr>
+        <p:txBody>
+          <a:bodyPr>
+            <a:normAutofit fontScale="90000"/>
+          </a:bodyPr>
+          <a:lstStyle/>
+          <a:p>
+            <a:r>
+              <a:rPr lang="en-CA" dirty="0"/>
+              <a:t>Testing:</a:t>
+            </a:r>
+          </a:p>
+        </p:txBody>
+      </p:sp>
+      <p:sp>
+        <p:nvSpPr>
+          <p:cNvPr id="4" name="Content Placeholder 3">
+            <a:extLst>
+              <a:ext uri="{FF2B5EF4-FFF2-40B4-BE49-F238E27FC236}">
+                <a16:creationId xmlns:a16="http://schemas.microsoft.com/office/drawing/2014/main" id="{DACDC7C0-DC09-4AEC-92E2-0608F5AABA63}"/>
+              </a:ext>
+            </a:extLst>
+          </p:cNvPr>
+          <p:cNvSpPr>
+            <a:spLocks noGrp="1"/>
+          </p:cNvSpPr>
+          <p:nvPr>
+            <p:ph idx="1"/>
+          </p:nvPr>
+        </p:nvSpPr>
+        <p:spPr>
+          <a:xfrm>
+            <a:off x="838200" y="1253330"/>
+            <a:ext cx="10515600" cy="5100335"/>
+          </a:xfrm>
+        </p:spPr>
+        <p:txBody>
+          <a:bodyPr>
+            <a:normAutofit/>
+          </a:bodyPr>
+          <a:lstStyle/>
+          <a:p>
+            <a:r>
+              <a:rPr lang="en-CA" dirty="0"/>
+              <a:t>Granular Conversation Test:</a:t>
+            </a:r>
+          </a:p>
+          <a:p>
+            <a:pPr marL="0" indent="0">
+              <a:buNone/>
+            </a:pPr>
+            <a:r>
+              <a:rPr lang="en-CA" dirty="0"/>
+              <a:t>-Semantics: “Does the response make sense by itself?”</a:t>
+            </a:r>
+          </a:p>
+          <a:p>
+            <a:pPr marL="0" indent="0">
+              <a:buNone/>
+            </a:pPr>
+            <a:r>
+              <a:rPr lang="en-CA" dirty="0"/>
+              <a:t>-Structure: “Is it understandable and does it follows a structure a human</a:t>
+            </a:r>
+          </a:p>
+          <a:p>
+            <a:pPr marL="0" indent="0">
+              <a:buNone/>
+            </a:pPr>
+            <a:r>
+              <a:rPr lang="en-CA" dirty="0"/>
+              <a:t>would use?”</a:t>
+            </a:r>
+          </a:p>
+          <a:p>
+            <a:pPr marL="0" indent="0">
+              <a:buNone/>
+            </a:pPr>
+            <a:r>
+              <a:rPr lang="en-CA" dirty="0"/>
+              <a:t>-Context: “Does the response make sense in the context?”</a:t>
+            </a:r>
+          </a:p>
+          <a:p>
+            <a:pPr marL="0" indent="0">
+              <a:buNone/>
+            </a:pPr>
+            <a:r>
+              <a:rPr lang="en-CA" dirty="0"/>
+              <a:t>-Feeling: “Does the response feel human?”</a:t>
+            </a:r>
+          </a:p>
+          <a:p>
+            <a:pPr marL="0" indent="0">
+              <a:buNone/>
+            </a:pPr>
+            <a:endParaRPr lang="en-CA" dirty="0"/>
+          </a:p>
+          <a:p>
+            <a:pPr marL="0" indent="0">
+              <a:buNone/>
+            </a:pPr>
+            <a:r>
+              <a:rPr lang="en-CA" dirty="0"/>
+              <a:t>0/1 scoring and takes average of all four components</a:t>
+            </a:r>
+          </a:p>
+        </p:txBody>
+      </p:sp>
+    </p:spTree>
+    <p:extLst>
+      <p:ext uri="{BB962C8B-B14F-4D97-AF65-F5344CB8AC3E}">
+        <p14:creationId xmlns:p14="http://schemas.microsoft.com/office/powerpoint/2010/main" val="1806790600"/>
+      </p:ext>
+    </p:extLst>
+  </p:cSld>
+  <p:clrMapOvr>
+    <a:masterClrMapping/>
+  </p:clrMapOvr>
+</p:sld>
+</file>
+
 <file path=ppt/slides/slide8.xml><?xml version="1.0" encoding="utf-8"?>
 <p:sld xmlns:a="http://schemas.openxmlformats.org/drawingml/2006/main" xmlns:r="http://schemas.openxmlformats.org/officeDocument/2006/relationships" xmlns:p="http://schemas.openxmlformats.org/presentationml/2006/main">
   <p:cSld>
@@ -5704,7 +6322,7 @@
           <p:cNvPr id="2" name="Title 1">
             <a:extLst>
               <a:ext uri="{FF2B5EF4-FFF2-40B4-BE49-F238E27FC236}">
-                <a16:creationId xmlns:a16="http://schemas.microsoft.com/office/drawing/2014/main" id="{42981A0C-B5E6-4708-B592-205E5FF8F57B}"/>
+                <a16:creationId xmlns:a16="http://schemas.microsoft.com/office/drawing/2014/main" id="{861ADC6D-3272-417A-A4CA-797A1BE670CB}"/>
               </a:ext>
             </a:extLst>
           </p:cNvPr>
@@ -5715,31 +6333,24 @@
             <p:ph type="title"/>
           </p:nvPr>
         </p:nvSpPr>
-        <p:spPr>
-          <a:xfrm>
-            <a:off x="838200" y="365126"/>
-            <a:ext cx="10515600" cy="417300"/>
-          </a:xfrm>
-        </p:spPr>
-        <p:txBody>
-          <a:bodyPr>
-            <a:normAutofit fontScale="90000"/>
-          </a:bodyPr>
+        <p:spPr/>
+        <p:txBody>
+          <a:bodyPr/>
           <a:lstStyle/>
           <a:p>
             <a:r>
               <a:rPr lang="en-CA" dirty="0"/>
-              <a:t>Testing:</a:t>
-            </a:r>
-          </a:p>
-        </p:txBody>
-      </p:sp>
-      <p:sp>
-        <p:nvSpPr>
-          <p:cNvPr id="4" name="Content Placeholder 3">
-            <a:extLst>
-              <a:ext uri="{FF2B5EF4-FFF2-40B4-BE49-F238E27FC236}">
-                <a16:creationId xmlns:a16="http://schemas.microsoft.com/office/drawing/2014/main" id="{DACDC7C0-DC09-4AEC-92E2-0608F5AABA63}"/>
+              <a:t>Challenges:</a:t>
+            </a:r>
+          </a:p>
+        </p:txBody>
+      </p:sp>
+      <p:sp>
+        <p:nvSpPr>
+          <p:cNvPr id="3" name="Content Placeholder 2">
+            <a:extLst>
+              <a:ext uri="{FF2B5EF4-FFF2-40B4-BE49-F238E27FC236}">
+                <a16:creationId xmlns:a16="http://schemas.microsoft.com/office/drawing/2014/main" id="{74E4DEA5-DDEF-4578-8F30-91949891E260}"/>
               </a:ext>
             </a:extLst>
           </p:cNvPr>
@@ -5750,81 +6361,26 @@
             <p:ph idx="1"/>
           </p:nvPr>
         </p:nvSpPr>
-        <p:spPr>
-          <a:xfrm>
-            <a:off x="838200" y="1253330"/>
-            <a:ext cx="10515600" cy="5100335"/>
-          </a:xfrm>
-        </p:spPr>
-        <p:txBody>
-          <a:bodyPr>
-            <a:normAutofit/>
-          </a:bodyPr>
+        <p:spPr/>
+        <p:txBody>
+          <a:bodyPr/>
           <a:lstStyle/>
           <a:p>
             <a:r>
               <a:rPr lang="en-CA" dirty="0"/>
-              <a:t>Granular Conversation Test:</a:t>
-            </a:r>
-          </a:p>
-          <a:p>
-            <a:pPr marL="0" indent="0">
-              <a:buNone/>
-            </a:pPr>
+              <a:t>Implementation is Q&amp;A based</a:t>
+            </a:r>
+          </a:p>
+          <a:p>
             <a:r>
               <a:rPr lang="en-CA" dirty="0"/>
-              <a:t>-Semantics: “Does the response make sense by itself?”</a:t>
-            </a:r>
-          </a:p>
-          <a:p>
-            <a:pPr marL="0" indent="0">
-              <a:buNone/>
-            </a:pPr>
+              <a:t>Q&amp;A answering system is deterministic</a:t>
+            </a:r>
+          </a:p>
+          <a:p>
             <a:r>
               <a:rPr lang="en-CA" dirty="0"/>
-              <a:t>-Structure: “Is it understandable and does it follows a structure a human</a:t>
-            </a:r>
-          </a:p>
-          <a:p>
-            <a:pPr marL="0" indent="0">
-              <a:buNone/>
-            </a:pPr>
-            <a:r>
-              <a:rPr lang="en-CA" dirty="0"/>
-              <a:t>would use?”</a:t>
-            </a:r>
-          </a:p>
-          <a:p>
-            <a:pPr marL="0" indent="0">
-              <a:buNone/>
-            </a:pPr>
-            <a:r>
-              <a:rPr lang="en-CA" dirty="0"/>
-              <a:t>-Context: “Does the response make sense in the context?”</a:t>
-            </a:r>
-          </a:p>
-          <a:p>
-            <a:pPr marL="0" indent="0">
-              <a:buNone/>
-            </a:pPr>
-            <a:r>
-              <a:rPr lang="en-CA" dirty="0"/>
-              <a:t>-Feeling: “Does the response feel human?”</a:t>
-            </a:r>
-          </a:p>
-          <a:p>
-            <a:pPr marL="0" indent="0">
-              <a:buNone/>
-            </a:pPr>
-            <a:endParaRPr lang="en-CA" dirty="0"/>
-          </a:p>
-          <a:p>
-            <a:pPr marL="0" indent="0">
-              <a:buNone/>
-            </a:pPr>
-            <a:r>
-              <a:rPr lang="en-CA" dirty="0"/>
-              <a:t>0/1 scoring and takes average of all four components</a:t>
+              <a:t>Each Q&amp;A are independent of each other</a:t>
             </a:r>
           </a:p>
         </p:txBody>
@@ -5832,7 +6388,7 @@
     </p:spTree>
     <p:extLst>
       <p:ext uri="{BB962C8B-B14F-4D97-AF65-F5344CB8AC3E}">
-        <p14:creationId xmlns:p14="http://schemas.microsoft.com/office/powerpoint/2010/main" val="1806790600"/>
+        <p14:creationId xmlns:p14="http://schemas.microsoft.com/office/powerpoint/2010/main" val="4043780860"/>
       </p:ext>
     </p:extLst>
   </p:cSld>
@@ -5864,7 +6420,7 @@
           <p:cNvPr id="2" name="Title 1">
             <a:extLst>
               <a:ext uri="{FF2B5EF4-FFF2-40B4-BE49-F238E27FC236}">
-                <a16:creationId xmlns:a16="http://schemas.microsoft.com/office/drawing/2014/main" id="{861ADC6D-3272-417A-A4CA-797A1BE670CB}"/>
+                <a16:creationId xmlns:a16="http://schemas.microsoft.com/office/drawing/2014/main" id="{E92FDF02-115D-46E1-A69D-9631888D4F04}"/>
               </a:ext>
             </a:extLst>
           </p:cNvPr>
@@ -5882,7 +6438,7 @@
           <a:p>
             <a:r>
               <a:rPr lang="en-CA" dirty="0"/>
-              <a:t>Problems:</a:t>
+              <a:t>Our approach:</a:t>
             </a:r>
           </a:p>
         </p:txBody>
@@ -5892,7 +6448,7 @@
           <p:cNvPr id="3" name="Content Placeholder 2">
             <a:extLst>
               <a:ext uri="{FF2B5EF4-FFF2-40B4-BE49-F238E27FC236}">
-                <a16:creationId xmlns:a16="http://schemas.microsoft.com/office/drawing/2014/main" id="{74E4DEA5-DDEF-4578-8F30-91949891E260}"/>
+                <a16:creationId xmlns:a16="http://schemas.microsoft.com/office/drawing/2014/main" id="{F6C05C56-86B0-49AE-A0B7-BC021DA5BC0A}"/>
               </a:ext>
             </a:extLst>
           </p:cNvPr>
@@ -5910,27 +6466,39 @@
           <a:p>
             <a:r>
               <a:rPr lang="en-CA" dirty="0"/>
-              <a:t>Implementation is Q&amp;A based</a:t>
-            </a:r>
+              <a:t>Transfer learning on targeted domain: achieve better performance on target domain while benefiting from source domain (dialog space is both source and target domain)</a:t>
+            </a:r>
+          </a:p>
+          <a:p>
+            <a:endParaRPr lang="en-CA" dirty="0"/>
           </a:p>
           <a:p>
             <a:r>
               <a:rPr lang="en-CA" dirty="0"/>
-              <a:t>Q&amp;A answering system is deterministic</a:t>
-            </a:r>
+              <a:t>Intent based dialog management using LSTM</a:t>
+            </a:r>
+          </a:p>
+          <a:p>
+            <a:endParaRPr lang="en-CA" dirty="0"/>
           </a:p>
           <a:p>
             <a:r>
               <a:rPr lang="en-CA" dirty="0"/>
-              <a:t>Each Q&amp;A are independent of each other</a:t>
-            </a:r>
+              <a:t>Interlocutor tracking system</a:t>
+            </a:r>
+          </a:p>
+          <a:p>
+            <a:endParaRPr lang="en-CA" dirty="0"/>
+          </a:p>
+          <a:p>
+            <a:endParaRPr lang="en-CA" dirty="0"/>
           </a:p>
         </p:txBody>
       </p:sp>
     </p:spTree>
     <p:extLst>
       <p:ext uri="{BB962C8B-B14F-4D97-AF65-F5344CB8AC3E}">
-        <p14:creationId xmlns:p14="http://schemas.microsoft.com/office/powerpoint/2010/main" val="4043780860"/>
+        <p14:creationId xmlns:p14="http://schemas.microsoft.com/office/powerpoint/2010/main" val="2354734232"/>
       </p:ext>
     </p:extLst>
   </p:cSld>

</xml_diff>